<commit_message>
completed hot tub amply code, added note to ppt about amply and white space
</commit_message>
<xml_diff>
--- a/LEC/lec04-pulp-with-dicts-amply/some PuLP reference; AMPLY.pptx
+++ b/LEC/lec04-pulp-with-dicts-amply/some PuLP reference; AMPLY.pptx
@@ -136,6 +136,7 @@
 <file path=ppt/revisionInfo.xml><?xml version="1.0" encoding="utf-8"?>
 <p1510:revInfo xmlns:a="http://schemas.openxmlformats.org/drawingml/2006/main" xmlns:r="http://schemas.openxmlformats.org/officeDocument/2006/relationships" xmlns:p1510="http://schemas.microsoft.com/office/powerpoint/2015/10/main">
   <p1510:revLst>
+    <p1510:client id="{A6130220-C45C-4CAC-884D-80CF8A8C1DE2}" v="46" dt="2026-01-22T19:28:01.787"/>
     <p1510:client id="{E13FB76A-3CF5-4502-91AA-206F2829155F}" v="6" dt="2026-01-22T14:10:51.806"/>
   </p1510:revLst>
 </p1510:revInfo>
@@ -146,18 +147,33 @@
   <pc:docChgLst>
     <pc:chgData name="Frommer, Ian Dr. (EDU)" userId="28ca3ff0-544f-450a-928b-99e19cf49b89" providerId="ADAL" clId="{FDDA6EB0-4FD6-4516-ACA5-A4CAC6441DA7}"/>
     <pc:docChg chg="undo custSel addSld modSld">
-      <pc:chgData name="Frommer, Ian Dr. (EDU)" userId="28ca3ff0-544f-450a-928b-99e19cf49b89" providerId="ADAL" clId="{FDDA6EB0-4FD6-4516-ACA5-A4CAC6441DA7}" dt="2026-01-22T14:10:51.806" v="389" actId="2711"/>
+      <pc:chgData name="Frommer, Ian Dr. (EDU)" userId="28ca3ff0-544f-450a-928b-99e19cf49b89" providerId="ADAL" clId="{FDDA6EB0-4FD6-4516-ACA5-A4CAC6441DA7}" dt="2026-01-22T19:29:32.902" v="637" actId="114"/>
       <pc:docMkLst>
         <pc:docMk/>
       </pc:docMkLst>
+      <pc:sldChg chg="addSp modSp mod">
+        <pc:chgData name="Frommer, Ian Dr. (EDU)" userId="28ca3ff0-544f-450a-928b-99e19cf49b89" providerId="ADAL" clId="{FDDA6EB0-4FD6-4516-ACA5-A4CAC6441DA7}" dt="2026-01-22T19:29:32.902" v="637" actId="114"/>
+        <pc:sldMkLst>
+          <pc:docMk/>
+          <pc:sldMk cId="2196191926" sldId="270"/>
+        </pc:sldMkLst>
+        <pc:spChg chg="add mod">
+          <ac:chgData name="Frommer, Ian Dr. (EDU)" userId="28ca3ff0-544f-450a-928b-99e19cf49b89" providerId="ADAL" clId="{FDDA6EB0-4FD6-4516-ACA5-A4CAC6441DA7}" dt="2026-01-22T19:29:32.902" v="637" actId="114"/>
+          <ac:spMkLst>
+            <pc:docMk/>
+            <pc:sldMk cId="2196191926" sldId="270"/>
+            <ac:spMk id="7" creationId="{A60D4BF3-D5D5-EF32-EE18-AC1FDC013F9F}"/>
+          </ac:spMkLst>
+        </pc:spChg>
+      </pc:sldChg>
       <pc:sldChg chg="modSp">
-        <pc:chgData name="Frommer, Ian Dr. (EDU)" userId="28ca3ff0-544f-450a-928b-99e19cf49b89" providerId="ADAL" clId="{FDDA6EB0-4FD6-4516-ACA5-A4CAC6441DA7}" dt="2026-01-22T14:10:51.806" v="389" actId="2711"/>
+        <pc:chgData name="Frommer, Ian Dr. (EDU)" userId="28ca3ff0-544f-450a-928b-99e19cf49b89" providerId="ADAL" clId="{FDDA6EB0-4FD6-4516-ACA5-A4CAC6441DA7}" dt="2026-01-22T18:20:09.260" v="434" actId="5793"/>
         <pc:sldMkLst>
           <pc:docMk/>
           <pc:sldMk cId="4286695104" sldId="271"/>
         </pc:sldMkLst>
         <pc:spChg chg="mod">
-          <ac:chgData name="Frommer, Ian Dr. (EDU)" userId="28ca3ff0-544f-450a-928b-99e19cf49b89" providerId="ADAL" clId="{FDDA6EB0-4FD6-4516-ACA5-A4CAC6441DA7}" dt="2026-01-22T14:10:51.806" v="389" actId="2711"/>
+          <ac:chgData name="Frommer, Ian Dr. (EDU)" userId="28ca3ff0-544f-450a-928b-99e19cf49b89" providerId="ADAL" clId="{FDDA6EB0-4FD6-4516-ACA5-A4CAC6441DA7}" dt="2026-01-22T18:20:09.260" v="434" actId="5793"/>
           <ac:spMkLst>
             <pc:docMk/>
             <pc:sldMk cId="4286695104" sldId="271"/>
@@ -187,6 +203,29 @@
             <ac:graphicFrameMk id="4" creationId="{D2D599BC-E04B-2FE2-1C4C-E20871E2AF6B}"/>
           </ac:graphicFrameMkLst>
         </pc:graphicFrameChg>
+      </pc:sldChg>
+      <pc:sldChg chg="modSp mod">
+        <pc:chgData name="Frommer, Ian Dr. (EDU)" userId="28ca3ff0-544f-450a-928b-99e19cf49b89" providerId="ADAL" clId="{FDDA6EB0-4FD6-4516-ACA5-A4CAC6441DA7}" dt="2026-01-22T19:27:45.487" v="463" actId="20577"/>
+        <pc:sldMkLst>
+          <pc:docMk/>
+          <pc:sldMk cId="1168387768" sldId="276"/>
+        </pc:sldMkLst>
+        <pc:spChg chg="mod">
+          <ac:chgData name="Frommer, Ian Dr. (EDU)" userId="28ca3ff0-544f-450a-928b-99e19cf49b89" providerId="ADAL" clId="{FDDA6EB0-4FD6-4516-ACA5-A4CAC6441DA7}" dt="2026-01-22T19:27:45.487" v="463" actId="20577"/>
+          <ac:spMkLst>
+            <pc:docMk/>
+            <pc:sldMk cId="1168387768" sldId="276"/>
+            <ac:spMk id="3" creationId="{F7FD7BD3-06F5-A8E1-01E8-A4BFCE8F0D56}"/>
+          </ac:spMkLst>
+        </pc:spChg>
+        <pc:picChg chg="mod">
+          <ac:chgData name="Frommer, Ian Dr. (EDU)" userId="28ca3ff0-544f-450a-928b-99e19cf49b89" providerId="ADAL" clId="{FDDA6EB0-4FD6-4516-ACA5-A4CAC6441DA7}" dt="2026-01-22T19:27:45.295" v="462" actId="1036"/>
+          <ac:picMkLst>
+            <pc:docMk/>
+            <pc:sldMk cId="1168387768" sldId="276"/>
+            <ac:picMk id="5" creationId="{9D6BF08E-8142-1277-931E-DAAE025F305D}"/>
+          </ac:picMkLst>
+        </pc:picChg>
       </pc:sldChg>
       <pc:sldChg chg="modSp new mod">
         <pc:chgData name="Frommer, Ian Dr. (EDU)" userId="28ca3ff0-544f-450a-928b-99e19cf49b89" providerId="ADAL" clId="{FDDA6EB0-4FD6-4516-ACA5-A4CAC6441DA7}" dt="2026-01-22T14:07:50.255" v="301" actId="20577"/>
@@ -4294,8 +4333,37 @@
                 <a:latin typeface="Courier New" panose="02070309020205020404" pitchFamily="49" charset="0"/>
                 <a:cs typeface="Courier New" panose="02070309020205020404" pitchFamily="49" charset="0"/>
               </a:rPr>
-              <a:t>from amply import Amply</a:t>
-            </a:r>
+              <a:t>from amply </a:t>
+            </a:r>
+            <a:r>
+              <a:rPr lang="en-US">
+                <a:latin typeface="Courier New" panose="02070309020205020404" pitchFamily="49" charset="0"/>
+                <a:cs typeface="Courier New" panose="02070309020205020404" pitchFamily="49" charset="0"/>
+              </a:rPr>
+              <a:t>import Amply</a:t>
+            </a:r>
+          </a:p>
+          <a:p>
+            <a:pPr marL="457200" lvl="1" indent="0">
+              <a:buNone/>
+            </a:pPr>
+            <a:r>
+              <a:rPr lang="en-US">
+                <a:cs typeface="Courier New" panose="02070309020205020404" pitchFamily="49" charset="0"/>
+              </a:rPr>
+              <a:t>or </a:t>
+            </a:r>
+            <a:r>
+              <a:rPr lang="en-US">
+                <a:latin typeface="Courier New" panose="02070309020205020404" pitchFamily="49" charset="0"/>
+                <a:cs typeface="Courier New" panose="02070309020205020404" pitchFamily="49" charset="0"/>
+              </a:rPr>
+              <a:t>from amply import *</a:t>
+            </a:r>
+            <a:endParaRPr lang="en-US" dirty="0">
+              <a:latin typeface="Courier New" panose="02070309020205020404" pitchFamily="49" charset="0"/>
+              <a:cs typeface="Courier New" panose="02070309020205020404" pitchFamily="49" charset="0"/>
+            </a:endParaRPr>
           </a:p>
           <a:p>
             <a:pPr lvl="1"/>
@@ -4402,7 +4470,7 @@
                                         <p:tgtEl>
                                           <p:spTgt spid="3">
                                             <p:txEl>
-                                              <p:pRg st="6" end="6"/>
+                                              <p:pRg st="7" end="7"/>
                                             </p:txEl>
                                           </p:spTgt>
                                         </p:tgtEl>
@@ -4433,7 +4501,7 @@
                                         <p:tgtEl>
                                           <p:spTgt spid="3">
                                             <p:txEl>
-                                              <p:pRg st="7" end="7"/>
+                                              <p:pRg st="8" end="8"/>
                                             </p:txEl>
                                           </p:spTgt>
                                         </p:tgtEl>
@@ -4464,7 +4532,7 @@
                                         <p:tgtEl>
                                           <p:spTgt spid="3">
                                             <p:txEl>
-                                              <p:pRg st="8" end="8"/>
+                                              <p:pRg st="9" end="9"/>
                                             </p:txEl>
                                           </p:spTgt>
                                         </p:tgtEl>
@@ -7495,6 +7563,41 @@
                 <a:cs typeface="Courier New" panose="02070309020205020404" pitchFamily="49" charset="0"/>
               </a:rPr>
               <a:t>req[Aqua][labor] = 9</a:t>
+            </a:r>
+          </a:p>
+        </p:txBody>
+      </p:sp>
+      <p:sp>
+        <p:nvSpPr>
+          <p:cNvPr id="7" name="TextBox 6">
+            <a:extLst>
+              <a:ext uri="{FF2B5EF4-FFF2-40B4-BE49-F238E27FC236}">
+                <a16:creationId xmlns:a16="http://schemas.microsoft.com/office/drawing/2014/main" id="{A60D4BF3-D5D5-EF32-EE18-AC1FDC013F9F}"/>
+              </a:ext>
+            </a:extLst>
+          </p:cNvPr>
+          <p:cNvSpPr txBox="1"/>
+          <p:nvPr/>
+        </p:nvSpPr>
+        <p:spPr>
+          <a:xfrm>
+            <a:off x="7663268" y="1451066"/>
+            <a:ext cx="4003830" cy="1200329"/>
+          </a:xfrm>
+          <a:prstGeom prst="rect">
+            <a:avLst/>
+          </a:prstGeom>
+          <a:noFill/>
+        </p:spPr>
+        <p:txBody>
+          <a:bodyPr wrap="square" rtlCol="0">
+            <a:spAutoFit/>
+          </a:bodyPr>
+          <a:lstStyle/>
+          <a:p>
+            <a:r>
+              <a:rPr lang="en-US" i="1"/>
+              <a:t>Note: Amply is not particular about spacing as long as white space separates each word or number.  E.g.,  you could put everything on one line.</a:t>
             </a:r>
           </a:p>
         </p:txBody>
@@ -9162,8 +9265,13 @@
           <a:p>
             <a:r>
               <a:rPr lang="en-US" dirty="0"/>
-              <a:t>Note: Amply requires leading 0s in decimals:  do 0.9 not .9</a:t>
-            </a:r>
+              <a:t>Note: Amply requires leading 0s in decimals:  do 0.9 not </a:t>
+            </a:r>
+            <a:r>
+              <a:rPr lang="en-US"/>
+              <a:t>.9</a:t>
+            </a:r>
+            <a:endParaRPr lang="en-US" dirty="0"/>
           </a:p>
           <a:p>
             <a:r>

</xml_diff>